<commit_message>
Fixes and changes: FRONTEND: - date_finish DatePicker starts from date_start - attachments allowed before prefered_idea and date selection
NATIVE:
- RefreshControl in GroupDetailScreen
- remove idea in group
- can delete permanently profile idea in group idea list
- password reset link
</commit_message>
<xml_diff>
--- a/presentazione/holpoint.pptx
+++ b/presentazione/holpoint.pptx
@@ -3424,7 +3424,7 @@
           <a:lstStyle/>
           <a:p>
             <a:r>
-              <a:rPr lang="it-IT" sz="2000" dirty="0">
+              <a:rPr lang="it-IT" sz="1600" dirty="0">
                 <a:latin typeface="Roboto Light" panose="02000000000000000000" pitchFamily="2" charset="0"/>
                 <a:ea typeface="Roboto Light" panose="02000000000000000000" pitchFamily="2" charset="0"/>
               </a:rPr>
@@ -3433,21 +3433,21 @@
           </a:p>
           <a:p>
             <a:r>
-              <a:rPr lang="it-IT" sz="2000" dirty="0">
+              <a:rPr lang="it-IT" sz="1600" dirty="0">
                 <a:latin typeface="Roboto Light" panose="02000000000000000000" pitchFamily="2" charset="0"/>
                 <a:ea typeface="Roboto Light" panose="02000000000000000000" pitchFamily="2" charset="0"/>
                 <a:hlinkClick r:id="rId2"/>
               </a:rPr>
               <a:t>213808@studenti.unimore.it</a:t>
             </a:r>
-            <a:endParaRPr lang="it-IT" sz="2000" dirty="0">
+            <a:endParaRPr lang="it-IT" sz="1600" dirty="0">
               <a:latin typeface="Roboto Light" panose="02000000000000000000" pitchFamily="2" charset="0"/>
               <a:ea typeface="Roboto Light" panose="02000000000000000000" pitchFamily="2" charset="0"/>
             </a:endParaRPr>
           </a:p>
           <a:p>
             <a:r>
-              <a:rPr lang="it-IT" sz="2000" dirty="0">
+              <a:rPr lang="it-IT" sz="1600" dirty="0">
                 <a:latin typeface="Roboto Light" panose="02000000000000000000" pitchFamily="2" charset="0"/>
                 <a:ea typeface="Roboto Light" panose="02000000000000000000" pitchFamily="2" charset="0"/>
               </a:rPr>
@@ -3456,7 +3456,7 @@
           </a:p>
           <a:p>
             <a:r>
-              <a:rPr lang="it-IT" sz="2000" dirty="0">
+              <a:rPr lang="it-IT" sz="1600" dirty="0">
                 <a:latin typeface="Roboto Light" panose="02000000000000000000" pitchFamily="2" charset="0"/>
                 <a:ea typeface="Roboto Light" panose="02000000000000000000" pitchFamily="2" charset="0"/>
               </a:rPr>

</xml_diff>